<commit_message>
replace jquery-ui tab widget with jquery tools tab widget
</commit_message>
<xml_diff>
--- a/doc/Rails_Database_Schema_Models.pptx
+++ b/doc/Rails_Database_Schema_Models.pptx
@@ -7,6 +7,7 @@
   <p:sldIdLst>
     <p:sldId id="256" r:id="rId2"/>
     <p:sldId id="257" r:id="rId3"/>
+    <p:sldId id="258" r:id="rId4"/>
   </p:sldIdLst>
   <p:sldSz cx="9144000" cy="6858000" type="screen4x3"/>
   <p:notesSz cx="6858000" cy="9144000"/>
@@ -6413,6 +6414,2152 @@
           </a:p>
         </p:txBody>
       </p:sp>
+    </p:spTree>
+  </p:cSld>
+  <p:clrMapOvr>
+    <a:masterClrMapping/>
+  </p:clrMapOvr>
+</p:sld>
+</file>
+
+<file path=ppt/slides/slide3.xml><?xml version="1.0" encoding="utf-8"?>
+<p:sld xmlns:a="http://schemas.openxmlformats.org/drawingml/2006/main" xmlns:r="http://schemas.openxmlformats.org/officeDocument/2006/relationships" xmlns:mc="http://schemas.openxmlformats.org/markup-compatibility/2006" xmlns:mv="urn:schemas-microsoft-com:mac:vml" xmlns:p="http://schemas.openxmlformats.org/presentationml/2006/main" mc:Ignorable="mv" mc:PreserveAttributes="mv:*">
+  <p:cSld>
+    <p:spTree>
+      <p:nvGrpSpPr>
+        <p:cNvPr id="1" name=""/>
+        <p:cNvGrpSpPr/>
+        <p:nvPr/>
+      </p:nvGrpSpPr>
+      <p:grpSpPr>
+        <a:xfrm>
+          <a:off x="0" y="0"/>
+          <a:ext cx="0" cy="0"/>
+          <a:chOff x="0" y="0"/>
+          <a:chExt cx="0" cy="0"/>
+        </a:xfrm>
+      </p:grpSpPr>
+      <p:sp>
+        <p:nvSpPr>
+          <p:cNvPr id="4" name="Rectangle 3"/>
+          <p:cNvSpPr/>
+          <p:nvPr/>
+        </p:nvSpPr>
+        <p:spPr>
+          <a:xfrm>
+            <a:off x="3779535" y="1179505"/>
+            <a:ext cx="1360639" cy="403190"/>
+          </a:xfrm>
+          <a:prstGeom prst="rect">
+            <a:avLst/>
+          </a:prstGeom>
+          <a:noFill/>
+          <a:effectLst/>
+        </p:spPr>
+        <p:style>
+          <a:lnRef idx="1">
+            <a:schemeClr val="accent1"/>
+          </a:lnRef>
+          <a:fillRef idx="3">
+            <a:schemeClr val="accent1"/>
+          </a:fillRef>
+          <a:effectRef idx="2">
+            <a:schemeClr val="accent1"/>
+          </a:effectRef>
+          <a:fontRef idx="minor">
+            <a:schemeClr val="lt1"/>
+          </a:fontRef>
+        </p:style>
+        <p:txBody>
+          <a:bodyPr rtlCol="0" anchor="ctr"/>
+          <a:lstStyle/>
+          <a:p>
+            <a:pPr algn="ctr"/>
+            <a:r>
+              <a:rPr lang="en-US" sz="1200" dirty="0" smtClean="0">
+                <a:solidFill>
+                  <a:schemeClr val="tx1">
+                    <a:lumMod val="50000"/>
+                    <a:lumOff val="50000"/>
+                  </a:schemeClr>
+                </a:solidFill>
+              </a:rPr>
+              <a:t>Manufacturer</a:t>
+            </a:r>
+            <a:endParaRPr lang="en-US" sz="1200" dirty="0">
+              <a:solidFill>
+                <a:schemeClr val="tx1">
+                  <a:lumMod val="50000"/>
+                  <a:lumOff val="50000"/>
+                </a:schemeClr>
+              </a:solidFill>
+            </a:endParaRPr>
+          </a:p>
+        </p:txBody>
+      </p:sp>
+      <p:sp>
+        <p:nvSpPr>
+          <p:cNvPr id="6" name="Rectangle 5"/>
+          <p:cNvSpPr/>
+          <p:nvPr/>
+        </p:nvSpPr>
+        <p:spPr>
+          <a:xfrm>
+            <a:off x="3779535" y="2096761"/>
+            <a:ext cx="1360639" cy="403190"/>
+          </a:xfrm>
+          <a:prstGeom prst="rect">
+            <a:avLst/>
+          </a:prstGeom>
+          <a:noFill/>
+          <a:effectLst/>
+        </p:spPr>
+        <p:style>
+          <a:lnRef idx="1">
+            <a:schemeClr val="accent1"/>
+          </a:lnRef>
+          <a:fillRef idx="3">
+            <a:schemeClr val="accent1"/>
+          </a:fillRef>
+          <a:effectRef idx="2">
+            <a:schemeClr val="accent1"/>
+          </a:effectRef>
+          <a:fontRef idx="minor">
+            <a:schemeClr val="lt1"/>
+          </a:fontRef>
+        </p:style>
+        <p:txBody>
+          <a:bodyPr rtlCol="0" anchor="ctr"/>
+          <a:lstStyle/>
+          <a:p>
+            <a:pPr algn="ctr"/>
+            <a:r>
+              <a:rPr lang="en-US" sz="1200" dirty="0" err="1" smtClean="0">
+                <a:solidFill>
+                  <a:schemeClr val="tx1">
+                    <a:lumMod val="50000"/>
+                    <a:lumOff val="50000"/>
+                  </a:schemeClr>
+                </a:solidFill>
+              </a:rPr>
+              <a:t>ProductLine</a:t>
+            </a:r>
+            <a:endParaRPr lang="en-US" sz="1200" dirty="0">
+              <a:solidFill>
+                <a:schemeClr val="tx1">
+                  <a:lumMod val="50000"/>
+                  <a:lumOff val="50000"/>
+                </a:schemeClr>
+              </a:solidFill>
+            </a:endParaRPr>
+          </a:p>
+        </p:txBody>
+      </p:sp>
+      <p:sp>
+        <p:nvSpPr>
+          <p:cNvPr id="7" name="Rectangle 6"/>
+          <p:cNvSpPr/>
+          <p:nvPr/>
+        </p:nvSpPr>
+        <p:spPr>
+          <a:xfrm>
+            <a:off x="3781917" y="3044257"/>
+            <a:ext cx="1360639" cy="403190"/>
+          </a:xfrm>
+          <a:prstGeom prst="rect">
+            <a:avLst/>
+          </a:prstGeom>
+          <a:noFill/>
+          <a:effectLst/>
+        </p:spPr>
+        <p:style>
+          <a:lnRef idx="1">
+            <a:schemeClr val="accent1"/>
+          </a:lnRef>
+          <a:fillRef idx="3">
+            <a:schemeClr val="accent1"/>
+          </a:fillRef>
+          <a:effectRef idx="2">
+            <a:schemeClr val="accent1"/>
+          </a:effectRef>
+          <a:fontRef idx="minor">
+            <a:schemeClr val="lt1"/>
+          </a:fontRef>
+        </p:style>
+        <p:txBody>
+          <a:bodyPr rtlCol="0" anchor="ctr"/>
+          <a:lstStyle/>
+          <a:p>
+            <a:pPr algn="ctr"/>
+            <a:r>
+              <a:rPr lang="en-US" sz="1200" dirty="0" err="1" smtClean="0">
+                <a:solidFill>
+                  <a:schemeClr val="tx1">
+                    <a:lumMod val="50000"/>
+                    <a:lumOff val="50000"/>
+                  </a:schemeClr>
+                </a:solidFill>
+              </a:rPr>
+              <a:t>BaseProduct</a:t>
+            </a:r>
+            <a:endParaRPr lang="en-US" sz="1200" dirty="0">
+              <a:solidFill>
+                <a:schemeClr val="tx1">
+                  <a:lumMod val="50000"/>
+                  <a:lumOff val="50000"/>
+                </a:schemeClr>
+              </a:solidFill>
+            </a:endParaRPr>
+          </a:p>
+        </p:txBody>
+      </p:sp>
+      <p:sp>
+        <p:nvSpPr>
+          <p:cNvPr id="9" name="Rectangle 8"/>
+          <p:cNvSpPr/>
+          <p:nvPr/>
+        </p:nvSpPr>
+        <p:spPr>
+          <a:xfrm>
+            <a:off x="1875880" y="746060"/>
+            <a:ext cx="1360639" cy="403190"/>
+          </a:xfrm>
+          <a:prstGeom prst="rect">
+            <a:avLst/>
+          </a:prstGeom>
+          <a:noFill/>
+          <a:effectLst/>
+        </p:spPr>
+        <p:style>
+          <a:lnRef idx="1">
+            <a:schemeClr val="accent1"/>
+          </a:lnRef>
+          <a:fillRef idx="3">
+            <a:schemeClr val="accent1"/>
+          </a:fillRef>
+          <a:effectRef idx="2">
+            <a:schemeClr val="accent1"/>
+          </a:effectRef>
+          <a:fontRef idx="minor">
+            <a:schemeClr val="lt1"/>
+          </a:fontRef>
+        </p:style>
+        <p:txBody>
+          <a:bodyPr rtlCol="0" anchor="ctr"/>
+          <a:lstStyle/>
+          <a:p>
+            <a:pPr algn="ctr"/>
+            <a:r>
+              <a:rPr lang="en-US" sz="1200" dirty="0" smtClean="0">
+                <a:solidFill>
+                  <a:schemeClr val="tx1">
+                    <a:lumMod val="50000"/>
+                    <a:lumOff val="50000"/>
+                  </a:schemeClr>
+                </a:solidFill>
+              </a:rPr>
+              <a:t>Category</a:t>
+            </a:r>
+            <a:endParaRPr lang="en-US" sz="1200" dirty="0">
+              <a:solidFill>
+                <a:schemeClr val="tx1">
+                  <a:lumMod val="50000"/>
+                  <a:lumOff val="50000"/>
+                </a:schemeClr>
+              </a:solidFill>
+            </a:endParaRPr>
+          </a:p>
+        </p:txBody>
+      </p:sp>
+      <p:sp>
+        <p:nvSpPr>
+          <p:cNvPr id="10" name="Rectangle 9"/>
+          <p:cNvSpPr/>
+          <p:nvPr/>
+        </p:nvSpPr>
+        <p:spPr>
+          <a:xfrm>
+            <a:off x="975044" y="1522201"/>
+            <a:ext cx="1360639" cy="403190"/>
+          </a:xfrm>
+          <a:prstGeom prst="rect">
+            <a:avLst/>
+          </a:prstGeom>
+          <a:noFill/>
+          <a:effectLst/>
+        </p:spPr>
+        <p:style>
+          <a:lnRef idx="1">
+            <a:schemeClr val="accent1"/>
+          </a:lnRef>
+          <a:fillRef idx="3">
+            <a:schemeClr val="accent1"/>
+          </a:fillRef>
+          <a:effectRef idx="2">
+            <a:schemeClr val="accent1"/>
+          </a:effectRef>
+          <a:fontRef idx="minor">
+            <a:schemeClr val="lt1"/>
+          </a:fontRef>
+        </p:style>
+        <p:txBody>
+          <a:bodyPr rtlCol="0" anchor="ctr"/>
+          <a:lstStyle/>
+          <a:p>
+            <a:pPr algn="ctr"/>
+            <a:r>
+              <a:rPr lang="en-US" sz="1200" dirty="0" err="1" smtClean="0">
+                <a:solidFill>
+                  <a:schemeClr val="tx1">
+                    <a:lumMod val="50000"/>
+                    <a:lumOff val="50000"/>
+                  </a:schemeClr>
+                </a:solidFill>
+              </a:rPr>
+              <a:t>TopLevelCategory</a:t>
+            </a:r>
+            <a:endParaRPr lang="en-US" sz="1200" dirty="0">
+              <a:solidFill>
+                <a:schemeClr val="tx1">
+                  <a:lumMod val="50000"/>
+                  <a:lumOff val="50000"/>
+                </a:schemeClr>
+              </a:solidFill>
+            </a:endParaRPr>
+          </a:p>
+        </p:txBody>
+      </p:sp>
+      <p:sp>
+        <p:nvSpPr>
+          <p:cNvPr id="11" name="Rectangle 10"/>
+          <p:cNvSpPr/>
+          <p:nvPr/>
+        </p:nvSpPr>
+        <p:spPr>
+          <a:xfrm>
+            <a:off x="1713233" y="2086671"/>
+            <a:ext cx="1360639" cy="403190"/>
+          </a:xfrm>
+          <a:prstGeom prst="rect">
+            <a:avLst/>
+          </a:prstGeom>
+          <a:noFill/>
+          <a:effectLst/>
+        </p:spPr>
+        <p:style>
+          <a:lnRef idx="1">
+            <a:schemeClr val="accent1"/>
+          </a:lnRef>
+          <a:fillRef idx="3">
+            <a:schemeClr val="accent1"/>
+          </a:fillRef>
+          <a:effectRef idx="2">
+            <a:schemeClr val="accent1"/>
+          </a:effectRef>
+          <a:fontRef idx="minor">
+            <a:schemeClr val="lt1"/>
+          </a:fontRef>
+        </p:style>
+        <p:txBody>
+          <a:bodyPr rtlCol="0" anchor="ctr"/>
+          <a:lstStyle/>
+          <a:p>
+            <a:pPr algn="ctr"/>
+            <a:r>
+              <a:rPr lang="en-US" sz="1200" dirty="0" err="1" smtClean="0">
+                <a:solidFill>
+                  <a:schemeClr val="tx1">
+                    <a:lumMod val="50000"/>
+                    <a:lumOff val="50000"/>
+                  </a:schemeClr>
+                </a:solidFill>
+              </a:rPr>
+              <a:t>LeafLevelCategory</a:t>
+            </a:r>
+            <a:endParaRPr lang="en-US" sz="1200" dirty="0">
+              <a:solidFill>
+                <a:schemeClr val="tx1">
+                  <a:lumMod val="50000"/>
+                  <a:lumOff val="50000"/>
+                </a:schemeClr>
+              </a:solidFill>
+            </a:endParaRPr>
+          </a:p>
+        </p:txBody>
+      </p:sp>
+      <p:sp>
+        <p:nvSpPr>
+          <p:cNvPr id="12" name="Up Arrow 11"/>
+          <p:cNvSpPr/>
+          <p:nvPr/>
+        </p:nvSpPr>
+        <p:spPr>
+          <a:xfrm>
+            <a:off x="1733558" y="1179490"/>
+            <a:ext cx="618464" cy="312471"/>
+          </a:xfrm>
+          <a:prstGeom prst="upArrow">
+            <a:avLst/>
+          </a:prstGeom>
+          <a:noFill/>
+        </p:spPr>
+        <p:style>
+          <a:lnRef idx="1">
+            <a:schemeClr val="accent1"/>
+          </a:lnRef>
+          <a:fillRef idx="3">
+            <a:schemeClr val="accent1"/>
+          </a:fillRef>
+          <a:effectRef idx="2">
+            <a:schemeClr val="accent1"/>
+          </a:effectRef>
+          <a:fontRef idx="minor">
+            <a:schemeClr val="lt1"/>
+          </a:fontRef>
+        </p:style>
+        <p:txBody>
+          <a:bodyPr rtlCol="0" anchor="ctr"/>
+          <a:lstStyle/>
+          <a:p>
+            <a:pPr algn="ctr"/>
+            <a:endParaRPr lang="en-US"/>
+          </a:p>
+        </p:txBody>
+      </p:sp>
+      <p:sp>
+        <p:nvSpPr>
+          <p:cNvPr id="13" name="Up Arrow 12"/>
+          <p:cNvSpPr/>
+          <p:nvPr/>
+        </p:nvSpPr>
+        <p:spPr>
+          <a:xfrm>
+            <a:off x="2393553" y="1179490"/>
+            <a:ext cx="618464" cy="342711"/>
+          </a:xfrm>
+          <a:prstGeom prst="upArrow">
+            <a:avLst/>
+          </a:prstGeom>
+          <a:noFill/>
+        </p:spPr>
+        <p:style>
+          <a:lnRef idx="1">
+            <a:schemeClr val="accent1"/>
+          </a:lnRef>
+          <a:fillRef idx="3">
+            <a:schemeClr val="accent1"/>
+          </a:fillRef>
+          <a:effectRef idx="2">
+            <a:schemeClr val="accent1"/>
+          </a:effectRef>
+          <a:fontRef idx="minor">
+            <a:schemeClr val="lt1"/>
+          </a:fontRef>
+        </p:style>
+        <p:txBody>
+          <a:bodyPr rtlCol="0" anchor="ctr"/>
+          <a:lstStyle/>
+          <a:p>
+            <a:pPr algn="ctr"/>
+            <a:endParaRPr lang="en-US"/>
+          </a:p>
+        </p:txBody>
+      </p:sp>
+      <p:sp>
+        <p:nvSpPr>
+          <p:cNvPr id="15" name="Rectangle 14"/>
+          <p:cNvSpPr/>
+          <p:nvPr/>
+        </p:nvSpPr>
+        <p:spPr>
+          <a:xfrm>
+            <a:off x="2549939" y="1522201"/>
+            <a:ext cx="312443" cy="534230"/>
+          </a:xfrm>
+          <a:prstGeom prst="rect">
+            <a:avLst/>
+          </a:prstGeom>
+          <a:noFill/>
+        </p:spPr>
+        <p:style>
+          <a:lnRef idx="1">
+            <a:schemeClr val="accent1"/>
+          </a:lnRef>
+          <a:fillRef idx="3">
+            <a:schemeClr val="accent1"/>
+          </a:fillRef>
+          <a:effectRef idx="2">
+            <a:schemeClr val="accent1"/>
+          </a:effectRef>
+          <a:fontRef idx="minor">
+            <a:schemeClr val="lt1"/>
+          </a:fontRef>
+        </p:style>
+        <p:txBody>
+          <a:bodyPr rtlCol="0" anchor="ctr"/>
+          <a:lstStyle/>
+          <a:p>
+            <a:pPr algn="ctr"/>
+            <a:endParaRPr lang="en-US"/>
+          </a:p>
+        </p:txBody>
+      </p:sp>
+      <p:grpSp>
+        <p:nvGrpSpPr>
+          <p:cNvPr id="2" name="Group 24"/>
+          <p:cNvGrpSpPr/>
+          <p:nvPr/>
+        </p:nvGrpSpPr>
+        <p:grpSpPr>
+          <a:xfrm>
+            <a:off x="4459061" y="1572540"/>
+            <a:ext cx="3176" cy="514066"/>
+            <a:chOff x="5416566" y="1421167"/>
+            <a:chExt cx="3176" cy="514066"/>
+          </a:xfrm>
+        </p:grpSpPr>
+        <p:cxnSp>
+          <p:nvCxnSpPr>
+            <p:cNvPr id="17" name="Straight Arrow Connector 16"/>
+            <p:cNvCxnSpPr>
+              <a:stCxn id="4" idx="2"/>
+              <a:endCxn id="6" idx="0"/>
+            </p:cNvCxnSpPr>
+            <p:nvPr/>
+          </p:nvCxnSpPr>
+          <p:spPr>
+            <a:xfrm rot="5400000">
+              <a:off x="5160327" y="1677406"/>
+              <a:ext cx="514066" cy="1588"/>
+            </a:xfrm>
+            <a:prstGeom prst="straightConnector1">
+              <a:avLst/>
+            </a:prstGeom>
+            <a:ln>
+              <a:headEnd type="triangle" w="lg" len="lg"/>
+              <a:tailEnd type="triangle" w="lg" len="lg"/>
+            </a:ln>
+            <a:effectLst/>
+          </p:spPr>
+          <p:style>
+            <a:lnRef idx="2">
+              <a:schemeClr val="accent1"/>
+            </a:lnRef>
+            <a:fillRef idx="0">
+              <a:schemeClr val="accent1"/>
+            </a:fillRef>
+            <a:effectRef idx="1">
+              <a:schemeClr val="accent1"/>
+            </a:effectRef>
+            <a:fontRef idx="minor">
+              <a:schemeClr val="tx1"/>
+            </a:fontRef>
+          </p:style>
+        </p:cxnSp>
+        <p:cxnSp>
+          <p:nvCxnSpPr>
+            <p:cNvPr id="18" name="Straight Arrow Connector 17"/>
+            <p:cNvCxnSpPr/>
+            <p:nvPr/>
+          </p:nvCxnSpPr>
+          <p:spPr>
+            <a:xfrm rot="5400000">
+              <a:off x="5261711" y="1682514"/>
+              <a:ext cx="314474" cy="1588"/>
+            </a:xfrm>
+            <a:prstGeom prst="straightConnector1">
+              <a:avLst/>
+            </a:prstGeom>
+            <a:ln>
+              <a:headEnd type="none"/>
+              <a:tailEnd type="triangle" w="lg" len="lg"/>
+            </a:ln>
+            <a:effectLst/>
+          </p:spPr>
+          <p:style>
+            <a:lnRef idx="2">
+              <a:schemeClr val="accent1"/>
+            </a:lnRef>
+            <a:fillRef idx="0">
+              <a:schemeClr val="accent1"/>
+            </a:fillRef>
+            <a:effectRef idx="1">
+              <a:schemeClr val="accent1"/>
+            </a:effectRef>
+            <a:fontRef idx="minor">
+              <a:schemeClr val="tx1"/>
+            </a:fontRef>
+          </p:style>
+        </p:cxnSp>
+      </p:grpSp>
+      <p:grpSp>
+        <p:nvGrpSpPr>
+          <p:cNvPr id="3" name="Group 66"/>
+          <p:cNvGrpSpPr/>
+          <p:nvPr/>
+        </p:nvGrpSpPr>
+        <p:grpSpPr>
+          <a:xfrm>
+            <a:off x="4590437" y="3447447"/>
+            <a:ext cx="3176" cy="1255990"/>
+            <a:chOff x="4590437" y="3447447"/>
+            <a:chExt cx="3176" cy="1255990"/>
+          </a:xfrm>
+        </p:grpSpPr>
+        <p:cxnSp>
+          <p:nvCxnSpPr>
+            <p:cNvPr id="27" name="Straight Arrow Connector 26"/>
+            <p:cNvCxnSpPr/>
+            <p:nvPr/>
+          </p:nvCxnSpPr>
+          <p:spPr>
+            <a:xfrm rot="5400000">
+              <a:off x="3964824" y="4074648"/>
+              <a:ext cx="1255990" cy="1588"/>
+            </a:xfrm>
+            <a:prstGeom prst="straightConnector1">
+              <a:avLst/>
+            </a:prstGeom>
+            <a:ln>
+              <a:headEnd type="triangle" w="lg" len="lg"/>
+              <a:tailEnd type="triangle" w="lg" len="lg"/>
+            </a:ln>
+            <a:effectLst/>
+          </p:spPr>
+          <p:style>
+            <a:lnRef idx="2">
+              <a:schemeClr val="accent1"/>
+            </a:lnRef>
+            <a:fillRef idx="0">
+              <a:schemeClr val="accent1"/>
+            </a:fillRef>
+            <a:effectRef idx="1">
+              <a:schemeClr val="accent1"/>
+            </a:effectRef>
+            <a:fontRef idx="minor">
+              <a:schemeClr val="tx1"/>
+            </a:fontRef>
+          </p:style>
+        </p:cxnSp>
+        <p:cxnSp>
+          <p:nvCxnSpPr>
+            <p:cNvPr id="28" name="Straight Arrow Connector 27"/>
+            <p:cNvCxnSpPr/>
+            <p:nvPr/>
+          </p:nvCxnSpPr>
+          <p:spPr>
+            <a:xfrm rot="5400000">
+              <a:off x="4433994" y="4438883"/>
+              <a:ext cx="314474" cy="1588"/>
+            </a:xfrm>
+            <a:prstGeom prst="straightConnector1">
+              <a:avLst/>
+            </a:prstGeom>
+            <a:ln>
+              <a:headEnd type="none"/>
+              <a:tailEnd type="triangle" w="lg" len="lg"/>
+            </a:ln>
+            <a:effectLst/>
+          </p:spPr>
+          <p:style>
+            <a:lnRef idx="2">
+              <a:schemeClr val="accent1"/>
+            </a:lnRef>
+            <a:fillRef idx="0">
+              <a:schemeClr val="accent1"/>
+            </a:fillRef>
+            <a:effectRef idx="1">
+              <a:schemeClr val="accent1"/>
+            </a:effectRef>
+            <a:fontRef idx="minor">
+              <a:schemeClr val="tx1"/>
+            </a:fontRef>
+          </p:style>
+        </p:cxnSp>
+      </p:grpSp>
+      <p:grpSp>
+        <p:nvGrpSpPr>
+          <p:cNvPr id="5" name="Group 28"/>
+          <p:cNvGrpSpPr/>
+          <p:nvPr/>
+        </p:nvGrpSpPr>
+        <p:grpSpPr>
+          <a:xfrm>
+            <a:off x="4455885" y="2530191"/>
+            <a:ext cx="3176" cy="514066"/>
+            <a:chOff x="5416566" y="1432116"/>
+            <a:chExt cx="3176" cy="514066"/>
+          </a:xfrm>
+        </p:grpSpPr>
+        <p:cxnSp>
+          <p:nvCxnSpPr>
+            <p:cNvPr id="30" name="Straight Arrow Connector 29"/>
+            <p:cNvCxnSpPr/>
+            <p:nvPr/>
+          </p:nvCxnSpPr>
+          <p:spPr>
+            <a:xfrm rot="5400000">
+              <a:off x="5160327" y="1688355"/>
+              <a:ext cx="514066" cy="1588"/>
+            </a:xfrm>
+            <a:prstGeom prst="straightConnector1">
+              <a:avLst/>
+            </a:prstGeom>
+            <a:ln>
+              <a:headEnd type="triangle" w="lg" len="lg"/>
+              <a:tailEnd type="triangle" w="lg" len="lg"/>
+            </a:ln>
+            <a:effectLst/>
+          </p:spPr>
+          <p:style>
+            <a:lnRef idx="2">
+              <a:schemeClr val="accent1"/>
+            </a:lnRef>
+            <a:fillRef idx="0">
+              <a:schemeClr val="accent1"/>
+            </a:fillRef>
+            <a:effectRef idx="1">
+              <a:schemeClr val="accent1"/>
+            </a:effectRef>
+            <a:fontRef idx="minor">
+              <a:schemeClr val="tx1"/>
+            </a:fontRef>
+          </p:style>
+        </p:cxnSp>
+        <p:cxnSp>
+          <p:nvCxnSpPr>
+            <p:cNvPr id="31" name="Straight Arrow Connector 30"/>
+            <p:cNvCxnSpPr/>
+            <p:nvPr/>
+          </p:nvCxnSpPr>
+          <p:spPr>
+            <a:xfrm rot="5400000">
+              <a:off x="5261711" y="1682514"/>
+              <a:ext cx="314474" cy="1588"/>
+            </a:xfrm>
+            <a:prstGeom prst="straightConnector1">
+              <a:avLst/>
+            </a:prstGeom>
+            <a:ln>
+              <a:headEnd type="none"/>
+              <a:tailEnd type="triangle" w="lg" len="lg"/>
+            </a:ln>
+            <a:effectLst/>
+          </p:spPr>
+          <p:style>
+            <a:lnRef idx="2">
+              <a:schemeClr val="accent1"/>
+            </a:lnRef>
+            <a:fillRef idx="0">
+              <a:schemeClr val="accent1"/>
+            </a:fillRef>
+            <a:effectRef idx="1">
+              <a:schemeClr val="accent1"/>
+            </a:effectRef>
+            <a:fontRef idx="minor">
+              <a:schemeClr val="tx1"/>
+            </a:fontRef>
+          </p:style>
+        </p:cxnSp>
+      </p:grpSp>
+      <p:cxnSp>
+        <p:nvCxnSpPr>
+          <p:cNvPr id="33" name="Straight Arrow Connector 32"/>
+          <p:cNvCxnSpPr/>
+          <p:nvPr/>
+        </p:nvCxnSpPr>
+        <p:spPr>
+          <a:xfrm rot="5400000">
+            <a:off x="1700460" y="3240806"/>
+            <a:ext cx="1501892" cy="1"/>
+          </a:xfrm>
+          <a:prstGeom prst="straightConnector1">
+            <a:avLst/>
+          </a:prstGeom>
+          <a:ln>
+            <a:headEnd type="triangle" w="lg" len="lg"/>
+            <a:tailEnd type="none" w="lg" len="lg"/>
+          </a:ln>
+          <a:effectLst/>
+        </p:spPr>
+        <p:style>
+          <a:lnRef idx="2">
+            <a:schemeClr val="accent1"/>
+          </a:lnRef>
+          <a:fillRef idx="0">
+            <a:schemeClr val="accent1"/>
+          </a:fillRef>
+          <a:effectRef idx="1">
+            <a:schemeClr val="accent1"/>
+          </a:effectRef>
+          <a:fontRef idx="minor">
+            <a:schemeClr val="tx1"/>
+          </a:fontRef>
+        </p:style>
+      </p:cxnSp>
+      <p:cxnSp>
+        <p:nvCxnSpPr>
+          <p:cNvPr id="36" name="Straight Arrow Connector 35"/>
+          <p:cNvCxnSpPr/>
+          <p:nvPr/>
+        </p:nvCxnSpPr>
+        <p:spPr>
+          <a:xfrm rot="5400000">
+            <a:off x="2479356" y="2882977"/>
+            <a:ext cx="766053" cy="1588"/>
+          </a:xfrm>
+          <a:prstGeom prst="straightConnector1">
+            <a:avLst/>
+          </a:prstGeom>
+          <a:ln>
+            <a:headEnd type="triangle" w="lg" len="lg"/>
+            <a:tailEnd type="none" w="lg" len="lg"/>
+          </a:ln>
+          <a:effectLst/>
+        </p:spPr>
+        <p:style>
+          <a:lnRef idx="2">
+            <a:schemeClr val="accent1"/>
+          </a:lnRef>
+          <a:fillRef idx="0">
+            <a:schemeClr val="accent1"/>
+          </a:fillRef>
+          <a:effectRef idx="1">
+            <a:schemeClr val="accent1"/>
+          </a:effectRef>
+          <a:fontRef idx="minor">
+            <a:schemeClr val="tx1"/>
+          </a:fontRef>
+        </p:style>
+      </p:cxnSp>
+      <p:cxnSp>
+        <p:nvCxnSpPr>
+          <p:cNvPr id="40" name="Straight Arrow Connector 39"/>
+          <p:cNvCxnSpPr/>
+          <p:nvPr/>
+        </p:nvCxnSpPr>
+        <p:spPr>
+          <a:xfrm>
+            <a:off x="2861588" y="3266798"/>
+            <a:ext cx="913977" cy="1588"/>
+          </a:xfrm>
+          <a:prstGeom prst="straightConnector1">
+            <a:avLst/>
+          </a:prstGeom>
+          <a:ln>
+            <a:tailEnd type="triangle" w="lg" len="lg"/>
+          </a:ln>
+          <a:effectLst/>
+        </p:spPr>
+        <p:style>
+          <a:lnRef idx="2">
+            <a:schemeClr val="accent1"/>
+          </a:lnRef>
+          <a:fillRef idx="0">
+            <a:schemeClr val="accent1"/>
+          </a:fillRef>
+          <a:effectRef idx="1">
+            <a:schemeClr val="accent1"/>
+          </a:effectRef>
+          <a:fontRef idx="minor">
+            <a:schemeClr val="tx1"/>
+          </a:fontRef>
+        </p:style>
+      </p:cxnSp>
+      <p:cxnSp>
+        <p:nvCxnSpPr>
+          <p:cNvPr id="43" name="Straight Arrow Connector 42"/>
+          <p:cNvCxnSpPr/>
+          <p:nvPr/>
+        </p:nvCxnSpPr>
+        <p:spPr>
+          <a:xfrm>
+            <a:off x="3161091" y="3268386"/>
+            <a:ext cx="511249" cy="1588"/>
+          </a:xfrm>
+          <a:prstGeom prst="straightConnector1">
+            <a:avLst/>
+          </a:prstGeom>
+          <a:ln>
+            <a:tailEnd type="triangle" w="lg" len="lg"/>
+          </a:ln>
+          <a:effectLst/>
+        </p:spPr>
+        <p:style>
+          <a:lnRef idx="2">
+            <a:schemeClr val="accent1"/>
+          </a:lnRef>
+          <a:fillRef idx="0">
+            <a:schemeClr val="accent1"/>
+          </a:fillRef>
+          <a:effectRef idx="1">
+            <a:schemeClr val="accent1"/>
+          </a:effectRef>
+          <a:fontRef idx="minor">
+            <a:schemeClr val="tx1"/>
+          </a:fontRef>
+        </p:style>
+      </p:cxnSp>
+      <p:sp>
+        <p:nvSpPr>
+          <p:cNvPr id="8" name="Rectangle 7"/>
+          <p:cNvSpPr/>
+          <p:nvPr/>
+        </p:nvSpPr>
+        <p:spPr>
+          <a:xfrm>
+            <a:off x="3775565" y="4703437"/>
+            <a:ext cx="1360639" cy="403190"/>
+          </a:xfrm>
+          <a:prstGeom prst="rect">
+            <a:avLst/>
+          </a:prstGeom>
+          <a:noFill/>
+          <a:effectLst/>
+        </p:spPr>
+        <p:style>
+          <a:lnRef idx="1">
+            <a:schemeClr val="accent1"/>
+          </a:lnRef>
+          <a:fillRef idx="3">
+            <a:schemeClr val="accent1"/>
+          </a:fillRef>
+          <a:effectRef idx="2">
+            <a:schemeClr val="accent1"/>
+          </a:effectRef>
+          <a:fontRef idx="minor">
+            <a:schemeClr val="lt1"/>
+          </a:fontRef>
+        </p:style>
+        <p:txBody>
+          <a:bodyPr rtlCol="0" anchor="ctr"/>
+          <a:lstStyle/>
+          <a:p>
+            <a:pPr algn="ctr"/>
+            <a:r>
+              <a:rPr lang="en-US" sz="1200" dirty="0" smtClean="0">
+                <a:solidFill>
+                  <a:schemeClr val="tx1">
+                    <a:lumMod val="50000"/>
+                    <a:lumOff val="50000"/>
+                  </a:schemeClr>
+                </a:solidFill>
+              </a:rPr>
+              <a:t>Product</a:t>
+            </a:r>
+            <a:endParaRPr lang="en-US" sz="1200" dirty="0">
+              <a:solidFill>
+                <a:schemeClr val="tx1">
+                  <a:lumMod val="50000"/>
+                  <a:lumOff val="50000"/>
+                </a:schemeClr>
+              </a:solidFill>
+            </a:endParaRPr>
+          </a:p>
+        </p:txBody>
+      </p:sp>
+      <p:cxnSp>
+        <p:nvCxnSpPr>
+          <p:cNvPr id="45" name="Straight Arrow Connector 44"/>
+          <p:cNvCxnSpPr/>
+          <p:nvPr/>
+        </p:nvCxnSpPr>
+        <p:spPr>
+          <a:xfrm>
+            <a:off x="2048001" y="4920299"/>
+            <a:ext cx="1738858" cy="1588"/>
+          </a:xfrm>
+          <a:prstGeom prst="straightConnector1">
+            <a:avLst/>
+          </a:prstGeom>
+          <a:ln>
+            <a:tailEnd type="triangle" w="lg" len="lg"/>
+          </a:ln>
+          <a:effectLst/>
+        </p:spPr>
+        <p:style>
+          <a:lnRef idx="2">
+            <a:schemeClr val="accent1"/>
+          </a:lnRef>
+          <a:fillRef idx="0">
+            <a:schemeClr val="accent1"/>
+          </a:fillRef>
+          <a:effectRef idx="1">
+            <a:schemeClr val="accent1"/>
+          </a:effectRef>
+          <a:fontRef idx="minor">
+            <a:schemeClr val="tx1"/>
+          </a:fontRef>
+        </p:style>
+      </p:cxnSp>
+      <p:cxnSp>
+        <p:nvCxnSpPr>
+          <p:cNvPr id="46" name="Straight Arrow Connector 45"/>
+          <p:cNvCxnSpPr/>
+          <p:nvPr/>
+        </p:nvCxnSpPr>
+        <p:spPr>
+          <a:xfrm>
+            <a:off x="3172385" y="4918711"/>
+            <a:ext cx="511249" cy="1588"/>
+          </a:xfrm>
+          <a:prstGeom prst="straightConnector1">
+            <a:avLst/>
+          </a:prstGeom>
+          <a:ln>
+            <a:tailEnd type="triangle" w="lg" len="lg"/>
+          </a:ln>
+          <a:effectLst/>
+        </p:spPr>
+        <p:style>
+          <a:lnRef idx="2">
+            <a:schemeClr val="accent1"/>
+          </a:lnRef>
+          <a:fillRef idx="0">
+            <a:schemeClr val="accent1"/>
+          </a:fillRef>
+          <a:effectRef idx="1">
+            <a:schemeClr val="accent1"/>
+          </a:effectRef>
+          <a:fontRef idx="minor">
+            <a:schemeClr val="tx1"/>
+          </a:fontRef>
+        </p:style>
+      </p:cxnSp>
+      <p:cxnSp>
+        <p:nvCxnSpPr>
+          <p:cNvPr id="48" name="Straight Arrow Connector 47"/>
+          <p:cNvCxnSpPr/>
+          <p:nvPr/>
+        </p:nvCxnSpPr>
+        <p:spPr>
+          <a:xfrm>
+            <a:off x="5142556" y="4917123"/>
+            <a:ext cx="1236920" cy="1588"/>
+          </a:xfrm>
+          <a:prstGeom prst="straightConnector1">
+            <a:avLst/>
+          </a:prstGeom>
+          <a:ln>
+            <a:headEnd type="triangle" w="lg" len="lg"/>
+            <a:tailEnd type="triangle" w="lg" len="lg"/>
+          </a:ln>
+          <a:effectLst/>
+        </p:spPr>
+        <p:style>
+          <a:lnRef idx="2">
+            <a:schemeClr val="accent1"/>
+          </a:lnRef>
+          <a:fillRef idx="0">
+            <a:schemeClr val="accent1"/>
+          </a:fillRef>
+          <a:effectRef idx="1">
+            <a:schemeClr val="accent1"/>
+          </a:effectRef>
+          <a:fontRef idx="minor">
+            <a:schemeClr val="tx1"/>
+          </a:fontRef>
+        </p:style>
+      </p:cxnSp>
+      <p:sp>
+        <p:nvSpPr>
+          <p:cNvPr id="51" name="Rectangle 50"/>
+          <p:cNvSpPr/>
+          <p:nvPr/>
+        </p:nvSpPr>
+        <p:spPr>
+          <a:xfrm>
+            <a:off x="6379476" y="4733669"/>
+            <a:ext cx="1360639" cy="403190"/>
+          </a:xfrm>
+          <a:prstGeom prst="rect">
+            <a:avLst/>
+          </a:prstGeom>
+          <a:noFill/>
+          <a:effectLst/>
+        </p:spPr>
+        <p:style>
+          <a:lnRef idx="1">
+            <a:schemeClr val="accent1"/>
+          </a:lnRef>
+          <a:fillRef idx="3">
+            <a:schemeClr val="accent1"/>
+          </a:fillRef>
+          <a:effectRef idx="2">
+            <a:schemeClr val="accent1"/>
+          </a:effectRef>
+          <a:fontRef idx="minor">
+            <a:schemeClr val="lt1"/>
+          </a:fontRef>
+        </p:style>
+        <p:txBody>
+          <a:bodyPr rtlCol="0" anchor="ctr"/>
+          <a:lstStyle/>
+          <a:p>
+            <a:pPr algn="ctr"/>
+            <a:r>
+              <a:rPr lang="en-US" sz="1200" dirty="0" err="1" smtClean="0">
+                <a:solidFill>
+                  <a:schemeClr val="tx1">
+                    <a:lumMod val="50000"/>
+                    <a:lumOff val="50000"/>
+                  </a:schemeClr>
+                </a:solidFill>
+              </a:rPr>
+              <a:t>Netsuite</a:t>
+            </a:r>
+            <a:r>
+              <a:rPr lang="en-US" sz="1200" dirty="0" smtClean="0">
+                <a:solidFill>
+                  <a:schemeClr val="tx1">
+                    <a:lumMod val="50000"/>
+                    <a:lumOff val="50000"/>
+                  </a:schemeClr>
+                </a:solidFill>
+              </a:rPr>
+              <a:t> Item</a:t>
+            </a:r>
+            <a:endParaRPr lang="en-US" sz="1200" dirty="0">
+              <a:solidFill>
+                <a:schemeClr val="tx1">
+                  <a:lumMod val="50000"/>
+                  <a:lumOff val="50000"/>
+                </a:schemeClr>
+              </a:solidFill>
+            </a:endParaRPr>
+          </a:p>
+        </p:txBody>
+      </p:sp>
+      <p:sp>
+        <p:nvSpPr>
+          <p:cNvPr id="53" name="TextBox 52"/>
+          <p:cNvSpPr txBox="1"/>
+          <p:nvPr/>
+        </p:nvSpPr>
+        <p:spPr>
+          <a:xfrm>
+            <a:off x="537787" y="5403675"/>
+            <a:ext cx="6634395" cy="307777"/>
+          </a:xfrm>
+          <a:prstGeom prst="rect">
+            <a:avLst/>
+          </a:prstGeom>
+          <a:noFill/>
+        </p:spPr>
+        <p:txBody>
+          <a:bodyPr wrap="square" rtlCol="0">
+            <a:spAutoFit/>
+          </a:bodyPr>
+          <a:lstStyle/>
+          <a:p>
+            <a:r>
+              <a:rPr lang="en-US" sz="1400" dirty="0"/>
+              <a:t>S</a:t>
+            </a:r>
+            <a:r>
+              <a:rPr lang="en-US" sz="1400" dirty="0" smtClean="0"/>
+              <a:t>chema of  Rails database — or at least the part of it related to products  [ in ‘Model 2’ </a:t>
+            </a:r>
+            <a:r>
+              <a:rPr lang="en-US" sz="1400" dirty="0" smtClean="0"/>
+              <a:t>].  </a:t>
+            </a:r>
+            <a:endParaRPr lang="en-US" sz="1400" dirty="0"/>
+          </a:p>
+        </p:txBody>
+      </p:sp>
+      <p:sp>
+        <p:nvSpPr>
+          <p:cNvPr id="54" name="TextBox 53"/>
+          <p:cNvSpPr txBox="1"/>
+          <p:nvPr/>
+        </p:nvSpPr>
+        <p:spPr>
+          <a:xfrm>
+            <a:off x="638331" y="200022"/>
+            <a:ext cx="6950004" cy="261610"/>
+          </a:xfrm>
+          <a:prstGeom prst="rect">
+            <a:avLst/>
+          </a:prstGeom>
+          <a:noFill/>
+        </p:spPr>
+        <p:txBody>
+          <a:bodyPr wrap="square" rtlCol="0">
+            <a:spAutoFit/>
+          </a:bodyPr>
+          <a:lstStyle/>
+          <a:p>
+            <a:r>
+              <a:rPr lang="en-US" sz="1100" i="1" dirty="0" smtClean="0"/>
+              <a:t>This is the most natural choice for simple products that don’t have models — the bulk of the </a:t>
+            </a:r>
+            <a:r>
+              <a:rPr lang="en-US" sz="1100" i="1" dirty="0" err="1" smtClean="0"/>
+              <a:t>Tru</a:t>
+            </a:r>
+            <a:r>
+              <a:rPr lang="en-US" sz="1100" i="1" dirty="0" smtClean="0"/>
+              <a:t>-Medical product set </a:t>
+            </a:r>
+            <a:endParaRPr lang="en-US" sz="1100" i="1" dirty="0"/>
+          </a:p>
+        </p:txBody>
+      </p:sp>
+      <p:sp>
+        <p:nvSpPr>
+          <p:cNvPr id="55" name="TextBox 54"/>
+          <p:cNvSpPr txBox="1"/>
+          <p:nvPr/>
+        </p:nvSpPr>
+        <p:spPr>
+          <a:xfrm>
+            <a:off x="4024965" y="3509126"/>
+            <a:ext cx="629180" cy="261610"/>
+          </a:xfrm>
+          <a:prstGeom prst="rect">
+            <a:avLst/>
+          </a:prstGeom>
+          <a:noFill/>
+        </p:spPr>
+        <p:txBody>
+          <a:bodyPr wrap="none" rtlCol="0">
+            <a:spAutoFit/>
+          </a:bodyPr>
+          <a:lstStyle/>
+          <a:p>
+            <a:r>
+              <a:rPr lang="en-US" sz="1100" i="1" dirty="0" smtClean="0"/>
+              <a:t>models</a:t>
+            </a:r>
+            <a:endParaRPr lang="en-US" sz="1100" i="1" dirty="0"/>
+          </a:p>
+        </p:txBody>
+      </p:sp>
+      <p:sp>
+        <p:nvSpPr>
+          <p:cNvPr id="57" name="TextBox 56"/>
+          <p:cNvSpPr txBox="1"/>
+          <p:nvPr/>
+        </p:nvSpPr>
+        <p:spPr>
+          <a:xfrm>
+            <a:off x="5142556" y="2056431"/>
+            <a:ext cx="1286010" cy="769441"/>
+          </a:xfrm>
+          <a:prstGeom prst="rect">
+            <a:avLst/>
+          </a:prstGeom>
+          <a:noFill/>
+        </p:spPr>
+        <p:txBody>
+          <a:bodyPr wrap="none" rtlCol="0">
+            <a:spAutoFit/>
+          </a:bodyPr>
+          <a:lstStyle/>
+          <a:p>
+            <a:r>
+              <a:rPr lang="en-US" sz="1100" i="1" dirty="0" smtClean="0">
+                <a:solidFill>
+                  <a:srgbClr val="7F7F7F"/>
+                </a:solidFill>
+              </a:rPr>
+              <a:t>properties:</a:t>
+            </a:r>
+          </a:p>
+          <a:p>
+            <a:r>
+              <a:rPr lang="en-US" sz="1100" i="1" dirty="0" smtClean="0">
+                <a:solidFill>
+                  <a:srgbClr val="7F7F7F"/>
+                </a:solidFill>
+              </a:rPr>
+              <a:t>    name: string</a:t>
+            </a:r>
+          </a:p>
+          <a:p>
+            <a:r>
+              <a:rPr lang="en-US" sz="1100" i="1" dirty="0" smtClean="0">
+                <a:solidFill>
+                  <a:srgbClr val="7F7F7F"/>
+                </a:solidFill>
+              </a:rPr>
+              <a:t>    </a:t>
+            </a:r>
+            <a:r>
+              <a:rPr lang="en-US" sz="1100" i="1" dirty="0" err="1" smtClean="0">
+                <a:solidFill>
+                  <a:srgbClr val="7F7F7F"/>
+                </a:solidFill>
+              </a:rPr>
+              <a:t>logomark:image</a:t>
+            </a:r>
+            <a:endParaRPr lang="en-US" sz="1100" i="1" dirty="0" smtClean="0">
+              <a:solidFill>
+                <a:srgbClr val="7F7F7F"/>
+              </a:solidFill>
+            </a:endParaRPr>
+          </a:p>
+          <a:p>
+            <a:r>
+              <a:rPr lang="en-US" sz="1100" i="1" dirty="0" smtClean="0">
+                <a:solidFill>
+                  <a:srgbClr val="7F7F7F"/>
+                </a:solidFill>
+              </a:rPr>
+              <a:t>    </a:t>
+            </a:r>
+            <a:r>
+              <a:rPr lang="en-US" sz="1100" i="1" dirty="0" err="1" smtClean="0">
+                <a:solidFill>
+                  <a:srgbClr val="7F7F7F"/>
+                </a:solidFill>
+              </a:rPr>
+              <a:t>description;text</a:t>
+            </a:r>
+            <a:endParaRPr lang="en-US" sz="1100" i="1" dirty="0">
+              <a:solidFill>
+                <a:srgbClr val="7F7F7F"/>
+              </a:solidFill>
+            </a:endParaRPr>
+          </a:p>
+        </p:txBody>
+      </p:sp>
+      <p:sp>
+        <p:nvSpPr>
+          <p:cNvPr id="61" name="TextBox 60"/>
+          <p:cNvSpPr txBox="1"/>
+          <p:nvPr/>
+        </p:nvSpPr>
+        <p:spPr>
+          <a:xfrm>
+            <a:off x="4790977" y="3500246"/>
+            <a:ext cx="858340" cy="261610"/>
+          </a:xfrm>
+          <a:prstGeom prst="rect">
+            <a:avLst/>
+          </a:prstGeom>
+          <a:noFill/>
+        </p:spPr>
+        <p:txBody>
+          <a:bodyPr wrap="none" rtlCol="0">
+            <a:spAutoFit/>
+          </a:bodyPr>
+          <a:lstStyle/>
+          <a:p>
+            <a:r>
+              <a:rPr lang="en-US" sz="1100" i="1" dirty="0" smtClean="0"/>
+              <a:t>accessories</a:t>
+            </a:r>
+            <a:endParaRPr lang="en-US" sz="1100" i="1" dirty="0"/>
+          </a:p>
+        </p:txBody>
+      </p:sp>
+      <p:sp>
+        <p:nvSpPr>
+          <p:cNvPr id="39" name="Rectangle 38"/>
+          <p:cNvSpPr/>
+          <p:nvPr/>
+        </p:nvSpPr>
+        <p:spPr>
+          <a:xfrm>
+            <a:off x="2863177" y="3809472"/>
+            <a:ext cx="1360639" cy="403190"/>
+          </a:xfrm>
+          <a:prstGeom prst="rect">
+            <a:avLst/>
+          </a:prstGeom>
+          <a:noFill/>
+          <a:effectLst/>
+        </p:spPr>
+        <p:style>
+          <a:lnRef idx="1">
+            <a:schemeClr val="accent1"/>
+          </a:lnRef>
+          <a:fillRef idx="3">
+            <a:schemeClr val="accent1"/>
+          </a:fillRef>
+          <a:effectRef idx="2">
+            <a:schemeClr val="accent1"/>
+          </a:effectRef>
+          <a:fontRef idx="minor">
+            <a:schemeClr val="lt1"/>
+          </a:fontRef>
+        </p:style>
+        <p:txBody>
+          <a:bodyPr rtlCol="0" anchor="ctr"/>
+          <a:lstStyle/>
+          <a:p>
+            <a:pPr algn="ctr"/>
+            <a:r>
+              <a:rPr lang="en-US" sz="1200" dirty="0" err="1" smtClean="0">
+                <a:solidFill>
+                  <a:schemeClr val="tx1">
+                    <a:lumMod val="50000"/>
+                    <a:lumOff val="50000"/>
+                  </a:schemeClr>
+                </a:solidFill>
+              </a:rPr>
+              <a:t>ProductSet</a:t>
+            </a:r>
+            <a:endParaRPr lang="en-US" sz="1200" dirty="0">
+              <a:solidFill>
+                <a:schemeClr val="tx1">
+                  <a:lumMod val="50000"/>
+                  <a:lumOff val="50000"/>
+                </a:schemeClr>
+              </a:solidFill>
+            </a:endParaRPr>
+          </a:p>
+        </p:txBody>
+      </p:sp>
+      <p:grpSp>
+        <p:nvGrpSpPr>
+          <p:cNvPr id="14" name="Group 40"/>
+          <p:cNvGrpSpPr/>
+          <p:nvPr/>
+        </p:nvGrpSpPr>
+        <p:grpSpPr>
+          <a:xfrm>
+            <a:off x="3957757" y="4188485"/>
+            <a:ext cx="3176" cy="514066"/>
+            <a:chOff x="5416566" y="1432116"/>
+            <a:chExt cx="3176" cy="514066"/>
+          </a:xfrm>
+        </p:grpSpPr>
+        <p:cxnSp>
+          <p:nvCxnSpPr>
+            <p:cNvPr id="42" name="Straight Arrow Connector 41"/>
+            <p:cNvCxnSpPr/>
+            <p:nvPr/>
+          </p:nvCxnSpPr>
+          <p:spPr>
+            <a:xfrm rot="5400000">
+              <a:off x="5160327" y="1688355"/>
+              <a:ext cx="514066" cy="1588"/>
+            </a:xfrm>
+            <a:prstGeom prst="straightConnector1">
+              <a:avLst/>
+            </a:prstGeom>
+            <a:ln>
+              <a:headEnd type="triangle" w="lg" len="lg"/>
+              <a:tailEnd type="triangle" w="lg" len="lg"/>
+            </a:ln>
+            <a:effectLst/>
+          </p:spPr>
+          <p:style>
+            <a:lnRef idx="2">
+              <a:schemeClr val="accent1"/>
+            </a:lnRef>
+            <a:fillRef idx="0">
+              <a:schemeClr val="accent1"/>
+            </a:fillRef>
+            <a:effectRef idx="1">
+              <a:schemeClr val="accent1"/>
+            </a:effectRef>
+            <a:fontRef idx="minor">
+              <a:schemeClr val="tx1"/>
+            </a:fontRef>
+          </p:style>
+        </p:cxnSp>
+        <p:cxnSp>
+          <p:nvCxnSpPr>
+            <p:cNvPr id="44" name="Straight Arrow Connector 43"/>
+            <p:cNvCxnSpPr/>
+            <p:nvPr/>
+          </p:nvCxnSpPr>
+          <p:spPr>
+            <a:xfrm rot="5400000">
+              <a:off x="5261711" y="1682514"/>
+              <a:ext cx="314474" cy="1588"/>
+            </a:xfrm>
+            <a:prstGeom prst="straightConnector1">
+              <a:avLst/>
+            </a:prstGeom>
+            <a:ln>
+              <a:headEnd type="none"/>
+              <a:tailEnd type="triangle" w="lg" len="lg"/>
+            </a:ln>
+            <a:effectLst/>
+          </p:spPr>
+          <p:style>
+            <a:lnRef idx="2">
+              <a:schemeClr val="accent1"/>
+            </a:lnRef>
+            <a:fillRef idx="0">
+              <a:schemeClr val="accent1"/>
+            </a:fillRef>
+            <a:effectRef idx="1">
+              <a:schemeClr val="accent1"/>
+            </a:effectRef>
+            <a:fontRef idx="minor">
+              <a:schemeClr val="tx1"/>
+            </a:fontRef>
+          </p:style>
+        </p:cxnSp>
+      </p:grpSp>
+      <p:cxnSp>
+        <p:nvCxnSpPr>
+          <p:cNvPr id="49" name="Straight Arrow Connector 48"/>
+          <p:cNvCxnSpPr/>
+          <p:nvPr/>
+        </p:nvCxnSpPr>
+        <p:spPr>
+          <a:xfrm rot="5400000">
+            <a:off x="833575" y="3703493"/>
+            <a:ext cx="2427264" cy="1588"/>
+          </a:xfrm>
+          <a:prstGeom prst="straightConnector1">
+            <a:avLst/>
+          </a:prstGeom>
+          <a:ln>
+            <a:headEnd type="triangle" w="lg" len="lg"/>
+            <a:tailEnd type="none" w="lg" len="lg"/>
+          </a:ln>
+          <a:effectLst/>
+        </p:spPr>
+        <p:style>
+          <a:lnRef idx="2">
+            <a:schemeClr val="accent1"/>
+          </a:lnRef>
+          <a:fillRef idx="0">
+            <a:schemeClr val="accent1"/>
+          </a:fillRef>
+          <a:effectRef idx="1">
+            <a:schemeClr val="accent1"/>
+          </a:effectRef>
+          <a:fontRef idx="minor">
+            <a:schemeClr val="tx1"/>
+          </a:fontRef>
+        </p:style>
+      </p:cxnSp>
+      <p:cxnSp>
+        <p:nvCxnSpPr>
+          <p:cNvPr id="50" name="Straight Arrow Connector 49"/>
+          <p:cNvCxnSpPr/>
+          <p:nvPr/>
+        </p:nvCxnSpPr>
+        <p:spPr>
+          <a:xfrm>
+            <a:off x="2451405" y="4007746"/>
+            <a:ext cx="451952" cy="1588"/>
+          </a:xfrm>
+          <a:prstGeom prst="straightConnector1">
+            <a:avLst/>
+          </a:prstGeom>
+          <a:ln>
+            <a:tailEnd type="triangle" w="lg" len="lg"/>
+          </a:ln>
+          <a:effectLst/>
+        </p:spPr>
+        <p:style>
+          <a:lnRef idx="2">
+            <a:schemeClr val="accent1"/>
+          </a:lnRef>
+          <a:fillRef idx="0">
+            <a:schemeClr val="accent1"/>
+          </a:fillRef>
+          <a:effectRef idx="1">
+            <a:schemeClr val="accent1"/>
+          </a:effectRef>
+          <a:fontRef idx="minor">
+            <a:schemeClr val="tx1"/>
+          </a:fontRef>
+        </p:style>
+      </p:cxnSp>
+      <p:cxnSp>
+        <p:nvCxnSpPr>
+          <p:cNvPr id="56" name="Straight Arrow Connector 55"/>
+          <p:cNvCxnSpPr/>
+          <p:nvPr/>
+        </p:nvCxnSpPr>
+        <p:spPr>
+          <a:xfrm>
+            <a:off x="2549939" y="4009334"/>
+            <a:ext cx="250193" cy="1588"/>
+          </a:xfrm>
+          <a:prstGeom prst="straightConnector1">
+            <a:avLst/>
+          </a:prstGeom>
+          <a:ln>
+            <a:tailEnd type="triangle" w="lg" len="lg"/>
+          </a:ln>
+          <a:effectLst/>
+        </p:spPr>
+        <p:style>
+          <a:lnRef idx="2">
+            <a:schemeClr val="accent1"/>
+          </a:lnRef>
+          <a:fillRef idx="0">
+            <a:schemeClr val="accent1"/>
+          </a:fillRef>
+          <a:effectRef idx="1">
+            <a:schemeClr val="accent1"/>
+          </a:effectRef>
+          <a:fontRef idx="minor">
+            <a:schemeClr val="tx1"/>
+          </a:fontRef>
+        </p:style>
+      </p:cxnSp>
+      <p:grpSp>
+        <p:nvGrpSpPr>
+          <p:cNvPr id="16" name="Group 67"/>
+          <p:cNvGrpSpPr/>
+          <p:nvPr/>
+        </p:nvGrpSpPr>
+        <p:grpSpPr>
+          <a:xfrm>
+            <a:off x="4796202" y="3450439"/>
+            <a:ext cx="3176" cy="1255990"/>
+            <a:chOff x="4590437" y="3447447"/>
+            <a:chExt cx="3176" cy="1255990"/>
+          </a:xfrm>
+        </p:grpSpPr>
+        <p:cxnSp>
+          <p:nvCxnSpPr>
+            <p:cNvPr id="69" name="Straight Arrow Connector 68"/>
+            <p:cNvCxnSpPr/>
+            <p:nvPr/>
+          </p:nvCxnSpPr>
+          <p:spPr>
+            <a:xfrm rot="5400000">
+              <a:off x="3964824" y="4074648"/>
+              <a:ext cx="1255990" cy="1588"/>
+            </a:xfrm>
+            <a:prstGeom prst="straightConnector1">
+              <a:avLst/>
+            </a:prstGeom>
+            <a:ln>
+              <a:headEnd type="triangle" w="lg" len="lg"/>
+              <a:tailEnd type="triangle" w="lg" len="lg"/>
+            </a:ln>
+            <a:effectLst/>
+          </p:spPr>
+          <p:style>
+            <a:lnRef idx="2">
+              <a:schemeClr val="accent1"/>
+            </a:lnRef>
+            <a:fillRef idx="0">
+              <a:schemeClr val="accent1"/>
+            </a:fillRef>
+            <a:effectRef idx="1">
+              <a:schemeClr val="accent1"/>
+            </a:effectRef>
+            <a:fontRef idx="minor">
+              <a:schemeClr val="tx1"/>
+            </a:fontRef>
+          </p:style>
+        </p:cxnSp>
+        <p:cxnSp>
+          <p:nvCxnSpPr>
+            <p:cNvPr id="70" name="Straight Arrow Connector 69"/>
+            <p:cNvCxnSpPr/>
+            <p:nvPr/>
+          </p:nvCxnSpPr>
+          <p:spPr>
+            <a:xfrm rot="5400000">
+              <a:off x="4433994" y="4438883"/>
+              <a:ext cx="314474" cy="1588"/>
+            </a:xfrm>
+            <a:prstGeom prst="straightConnector1">
+              <a:avLst/>
+            </a:prstGeom>
+            <a:ln>
+              <a:headEnd type="none"/>
+              <a:tailEnd type="triangle" w="lg" len="lg"/>
+            </a:ln>
+            <a:effectLst/>
+          </p:spPr>
+          <p:style>
+            <a:lnRef idx="2">
+              <a:schemeClr val="accent1"/>
+            </a:lnRef>
+            <a:fillRef idx="0">
+              <a:schemeClr val="accent1"/>
+            </a:fillRef>
+            <a:effectRef idx="1">
+              <a:schemeClr val="accent1"/>
+            </a:effectRef>
+            <a:fontRef idx="minor">
+              <a:schemeClr val="tx1"/>
+            </a:fontRef>
+          </p:style>
+        </p:cxnSp>
+      </p:grpSp>
+      <p:sp>
+        <p:nvSpPr>
+          <p:cNvPr id="71" name="TextBox 70"/>
+          <p:cNvSpPr txBox="1"/>
+          <p:nvPr/>
+        </p:nvSpPr>
+        <p:spPr>
+          <a:xfrm>
+            <a:off x="2988741" y="4212662"/>
+            <a:ext cx="1039492" cy="261610"/>
+          </a:xfrm>
+          <a:prstGeom prst="rect">
+            <a:avLst/>
+          </a:prstGeom>
+          <a:noFill/>
+        </p:spPr>
+        <p:txBody>
+          <a:bodyPr wrap="none" rtlCol="0">
+            <a:spAutoFit/>
+          </a:bodyPr>
+          <a:lstStyle/>
+          <a:p>
+            <a:r>
+              <a:rPr lang="en-US" sz="1100" i="1" dirty="0" smtClean="0"/>
+              <a:t>configurations</a:t>
+            </a:r>
+            <a:endParaRPr lang="en-US" sz="1100" i="1" dirty="0"/>
+          </a:p>
+        </p:txBody>
+      </p:sp>
+      <p:grpSp>
+        <p:nvGrpSpPr>
+          <p:cNvPr id="19" name="Group 71"/>
+          <p:cNvGrpSpPr/>
+          <p:nvPr/>
+        </p:nvGrpSpPr>
+        <p:grpSpPr>
+          <a:xfrm>
+            <a:off x="4110157" y="4202149"/>
+            <a:ext cx="3176" cy="514066"/>
+            <a:chOff x="5416566" y="1432116"/>
+            <a:chExt cx="3176" cy="514066"/>
+          </a:xfrm>
+        </p:grpSpPr>
+        <p:cxnSp>
+          <p:nvCxnSpPr>
+            <p:cNvPr id="73" name="Straight Arrow Connector 72"/>
+            <p:cNvCxnSpPr/>
+            <p:nvPr/>
+          </p:nvCxnSpPr>
+          <p:spPr>
+            <a:xfrm rot="5400000">
+              <a:off x="5160327" y="1688355"/>
+              <a:ext cx="514066" cy="1588"/>
+            </a:xfrm>
+            <a:prstGeom prst="straightConnector1">
+              <a:avLst/>
+            </a:prstGeom>
+            <a:ln>
+              <a:solidFill>
+                <a:schemeClr val="bg1">
+                  <a:lumMod val="75000"/>
+                </a:schemeClr>
+              </a:solidFill>
+              <a:headEnd type="triangle" w="lg" len="lg"/>
+              <a:tailEnd type="triangle" w="lg" len="lg"/>
+            </a:ln>
+            <a:effectLst/>
+          </p:spPr>
+          <p:style>
+            <a:lnRef idx="2">
+              <a:schemeClr val="accent1"/>
+            </a:lnRef>
+            <a:fillRef idx="0">
+              <a:schemeClr val="accent1"/>
+            </a:fillRef>
+            <a:effectRef idx="1">
+              <a:schemeClr val="accent1"/>
+            </a:effectRef>
+            <a:fontRef idx="minor">
+              <a:schemeClr val="tx1"/>
+            </a:fontRef>
+          </p:style>
+        </p:cxnSp>
+        <p:cxnSp>
+          <p:nvCxnSpPr>
+            <p:cNvPr id="74" name="Straight Arrow Connector 73"/>
+            <p:cNvCxnSpPr/>
+            <p:nvPr/>
+          </p:nvCxnSpPr>
+          <p:spPr>
+            <a:xfrm rot="5400000">
+              <a:off x="5261711" y="1682514"/>
+              <a:ext cx="314474" cy="1588"/>
+            </a:xfrm>
+            <a:prstGeom prst="straightConnector1">
+              <a:avLst/>
+            </a:prstGeom>
+            <a:ln>
+              <a:solidFill>
+                <a:schemeClr val="bg1">
+                  <a:lumMod val="75000"/>
+                </a:schemeClr>
+              </a:solidFill>
+              <a:headEnd type="none"/>
+              <a:tailEnd type="triangle" w="lg" len="lg"/>
+            </a:ln>
+            <a:effectLst/>
+          </p:spPr>
+          <p:style>
+            <a:lnRef idx="2">
+              <a:schemeClr val="accent1"/>
+            </a:lnRef>
+            <a:fillRef idx="0">
+              <a:schemeClr val="accent1"/>
+            </a:fillRef>
+            <a:effectRef idx="1">
+              <a:schemeClr val="accent1"/>
+            </a:effectRef>
+            <a:fontRef idx="minor">
+              <a:schemeClr val="tx1"/>
+            </a:fontRef>
+          </p:style>
+        </p:cxnSp>
+      </p:grpSp>
+      <p:sp>
+        <p:nvSpPr>
+          <p:cNvPr id="75" name="TextBox 74"/>
+          <p:cNvSpPr txBox="1"/>
+          <p:nvPr/>
+        </p:nvSpPr>
+        <p:spPr>
+          <a:xfrm>
+            <a:off x="4085037" y="4239752"/>
+            <a:ext cx="858340" cy="261610"/>
+          </a:xfrm>
+          <a:prstGeom prst="rect">
+            <a:avLst/>
+          </a:prstGeom>
+          <a:noFill/>
+          <a:ln>
+            <a:solidFill>
+              <a:schemeClr val="bg1">
+                <a:lumMod val="75000"/>
+              </a:schemeClr>
+            </a:solidFill>
+          </a:ln>
+        </p:spPr>
+        <p:txBody>
+          <a:bodyPr wrap="none" rtlCol="0">
+            <a:spAutoFit/>
+          </a:bodyPr>
+          <a:lstStyle/>
+          <a:p>
+            <a:r>
+              <a:rPr lang="en-US" sz="1100" i="1" dirty="0" smtClean="0">
+                <a:solidFill>
+                  <a:schemeClr val="bg1">
+                    <a:lumMod val="75000"/>
+                  </a:schemeClr>
+                </a:solidFill>
+              </a:rPr>
+              <a:t>accessories</a:t>
+            </a:r>
+            <a:endParaRPr lang="en-US" sz="1100" i="1" dirty="0">
+              <a:solidFill>
+                <a:schemeClr val="bg1">
+                  <a:lumMod val="75000"/>
+                </a:schemeClr>
+              </a:solidFill>
+            </a:endParaRPr>
+          </a:p>
+        </p:txBody>
+      </p:sp>
+      <p:sp>
+        <p:nvSpPr>
+          <p:cNvPr id="76" name="TextBox 75"/>
+          <p:cNvSpPr txBox="1"/>
+          <p:nvPr/>
+        </p:nvSpPr>
+        <p:spPr>
+          <a:xfrm>
+            <a:off x="350653" y="2236343"/>
+            <a:ext cx="1525227" cy="1615827"/>
+          </a:xfrm>
+          <a:prstGeom prst="rect">
+            <a:avLst/>
+          </a:prstGeom>
+          <a:noFill/>
+          <a:ln>
+            <a:noFill/>
+          </a:ln>
+        </p:spPr>
+        <p:txBody>
+          <a:bodyPr wrap="none" rtlCol="0">
+            <a:spAutoFit/>
+          </a:bodyPr>
+          <a:lstStyle/>
+          <a:p>
+            <a:r>
+              <a:rPr lang="en-US" sz="1100" i="1" dirty="0" smtClean="0">
+                <a:solidFill>
+                  <a:schemeClr val="bg1">
+                    <a:lumMod val="75000"/>
+                  </a:schemeClr>
+                </a:solidFill>
+              </a:rPr>
+              <a:t>Active Record does</a:t>
+            </a:r>
+          </a:p>
+          <a:p>
+            <a:r>
+              <a:rPr lang="en-US" sz="1100" i="1" dirty="0" smtClean="0">
+                <a:solidFill>
+                  <a:schemeClr val="bg1">
+                    <a:lumMod val="75000"/>
+                  </a:schemeClr>
+                </a:solidFill>
+              </a:rPr>
+              <a:t>subtypes by pushing </a:t>
+            </a:r>
+          </a:p>
+          <a:p>
+            <a:r>
+              <a:rPr lang="en-US" sz="1100" i="1" dirty="0" smtClean="0">
+                <a:solidFill>
+                  <a:schemeClr val="bg1">
+                    <a:lumMod val="75000"/>
+                  </a:schemeClr>
+                </a:solidFill>
+              </a:rPr>
+              <a:t>a type field into the </a:t>
+            </a:r>
+          </a:p>
+          <a:p>
+            <a:r>
+              <a:rPr lang="en-US" sz="1100" i="1" dirty="0" smtClean="0">
+                <a:solidFill>
+                  <a:schemeClr val="bg1">
+                    <a:lumMod val="75000"/>
+                  </a:schemeClr>
+                </a:solidFill>
+              </a:rPr>
+              <a:t>underlying SQL record</a:t>
+            </a:r>
+          </a:p>
+          <a:p>
+            <a:r>
+              <a:rPr lang="en-US" sz="1100" i="1" dirty="0" smtClean="0">
+                <a:solidFill>
+                  <a:schemeClr val="bg1">
+                    <a:lumMod val="75000"/>
+                  </a:schemeClr>
+                </a:solidFill>
+              </a:rPr>
+              <a:t>type, so we might as</a:t>
+            </a:r>
+          </a:p>
+          <a:p>
+            <a:r>
+              <a:rPr lang="en-US" sz="1100" i="1" dirty="0" smtClean="0">
+                <a:solidFill>
+                  <a:schemeClr val="bg1">
+                    <a:lumMod val="75000"/>
+                  </a:schemeClr>
+                </a:solidFill>
+              </a:rPr>
+              <a:t>well model this with</a:t>
+            </a:r>
+          </a:p>
+          <a:p>
+            <a:r>
+              <a:rPr lang="en-US" sz="1100" i="1" dirty="0" smtClean="0">
+                <a:solidFill>
+                  <a:schemeClr val="bg1">
+                    <a:lumMod val="75000"/>
+                  </a:schemeClr>
+                </a:solidFill>
+              </a:rPr>
+              <a:t>an explicit leaf-level? </a:t>
+            </a:r>
+          </a:p>
+          <a:p>
+            <a:r>
+              <a:rPr lang="en-US" sz="1100" i="1" dirty="0" smtClean="0">
+                <a:solidFill>
+                  <a:schemeClr val="bg1">
+                    <a:lumMod val="75000"/>
+                  </a:schemeClr>
+                </a:solidFill>
+              </a:rPr>
+              <a:t>column in the category</a:t>
+            </a:r>
+          </a:p>
+          <a:p>
+            <a:r>
+              <a:rPr lang="en-US" sz="1100" i="1" dirty="0" smtClean="0">
+                <a:solidFill>
+                  <a:schemeClr val="bg1">
+                    <a:lumMod val="75000"/>
+                  </a:schemeClr>
+                </a:solidFill>
+              </a:rPr>
+              <a:t>record ourselves. </a:t>
+            </a:r>
+            <a:endParaRPr lang="en-US" sz="1100" i="1" dirty="0" smtClean="0">
+              <a:solidFill>
+                <a:schemeClr val="bg1">
+                  <a:lumMod val="75000"/>
+                </a:schemeClr>
+              </a:solidFill>
+            </a:endParaRPr>
+          </a:p>
+        </p:txBody>
+      </p:sp>
+      <p:sp>
+        <p:nvSpPr>
+          <p:cNvPr id="77" name="TextBox 76"/>
+          <p:cNvSpPr txBox="1"/>
+          <p:nvPr/>
+        </p:nvSpPr>
+        <p:spPr>
+          <a:xfrm>
+            <a:off x="553231" y="5710751"/>
+            <a:ext cx="6950004" cy="938719"/>
+          </a:xfrm>
+          <a:prstGeom prst="rect">
+            <a:avLst/>
+          </a:prstGeom>
+          <a:noFill/>
+        </p:spPr>
+        <p:txBody>
+          <a:bodyPr wrap="square" rtlCol="0">
+            <a:spAutoFit/>
+          </a:bodyPr>
+          <a:lstStyle/>
+          <a:p>
+            <a:r>
+              <a:rPr lang="en-US" sz="1100" dirty="0" err="1" smtClean="0"/>
+              <a:t>BaseProducts</a:t>
+            </a:r>
+            <a:r>
+              <a:rPr lang="en-US" sz="1100" dirty="0" smtClean="0"/>
+              <a:t> have been introduced to handle products that come in sizes and colors, etc.  If there are only two </a:t>
+            </a:r>
+            <a:r>
+              <a:rPr lang="en-US" sz="1100" dirty="0" smtClean="0"/>
+              <a:t>dimensions to this matrix of size and color, we may want to expand this to an explicit 2-level tree — or put a column in base product for each of the dimensions, and have the view code for a product page dealing with a base product handle it.  Or, as a 3</a:t>
+            </a:r>
+            <a:r>
+              <a:rPr lang="en-US" sz="1100" baseline="30000" dirty="0" smtClean="0"/>
+              <a:t>rd</a:t>
+            </a:r>
+            <a:r>
+              <a:rPr lang="en-US" sz="1100" dirty="0" smtClean="0"/>
+              <a:t> option, have the action for </a:t>
+            </a:r>
+            <a:r>
+              <a:rPr lang="en-US" sz="1100" dirty="0" err="1" smtClean="0"/>
+              <a:t>BaseProduct#show</a:t>
+            </a:r>
+            <a:r>
+              <a:rPr lang="en-US" sz="1100" dirty="0" smtClean="0"/>
+              <a:t>, sort it out into a tree that it sends to the view.  So the view doesn’t see the actual database records, but instead the tree structure created by the action. </a:t>
+            </a:r>
+            <a:endParaRPr lang="en-US" sz="1100" dirty="0"/>
+          </a:p>
+        </p:txBody>
+      </p:sp>
+      <p:sp>
+        <p:nvSpPr>
+          <p:cNvPr id="78" name="TextBox 77"/>
+          <p:cNvSpPr txBox="1"/>
+          <p:nvPr/>
+        </p:nvSpPr>
+        <p:spPr>
+          <a:xfrm>
+            <a:off x="504943" y="4348134"/>
+            <a:ext cx="1248249" cy="607268"/>
+          </a:xfrm>
+          <a:prstGeom prst="rect">
+            <a:avLst/>
+          </a:prstGeom>
+          <a:noFill/>
+          <a:ln>
+            <a:noFill/>
+          </a:ln>
+        </p:spPr>
+        <p:txBody>
+          <a:bodyPr wrap="square" rtlCol="0">
+            <a:spAutoFit/>
+          </a:bodyPr>
+          <a:lstStyle/>
+          <a:p>
+            <a:r>
+              <a:rPr lang="en-US" sz="1100" i="1" dirty="0" smtClean="0">
+                <a:solidFill>
+                  <a:schemeClr val="bg1">
+                    <a:lumMod val="75000"/>
+                  </a:schemeClr>
+                </a:solidFill>
+              </a:rPr>
+              <a:t>called ‘</a:t>
+            </a:r>
+            <a:r>
+              <a:rPr lang="en-US" sz="1100" i="1" dirty="0" err="1" smtClean="0">
+                <a:solidFill>
+                  <a:schemeClr val="bg1">
+                    <a:lumMod val="75000"/>
+                  </a:schemeClr>
+                </a:solidFill>
+              </a:rPr>
+              <a:t>ProductSet</a:t>
+            </a:r>
+            <a:r>
+              <a:rPr lang="en-US" sz="1100" i="1" dirty="0" smtClean="0">
+                <a:solidFill>
+                  <a:schemeClr val="bg1">
+                    <a:lumMod val="75000"/>
+                  </a:schemeClr>
+                </a:solidFill>
+              </a:rPr>
+              <a:t>’ in the current code base. Rename? </a:t>
+            </a:r>
+            <a:endParaRPr lang="en-US" sz="1100" i="1" dirty="0" smtClean="0">
+              <a:solidFill>
+                <a:schemeClr val="bg1">
+                  <a:lumMod val="75000"/>
+                </a:schemeClr>
+              </a:solidFill>
+            </a:endParaRPr>
+          </a:p>
+        </p:txBody>
+      </p:sp>
+      <p:cxnSp>
+        <p:nvCxnSpPr>
+          <p:cNvPr id="80" name="Straight Arrow Connector 79"/>
+          <p:cNvCxnSpPr/>
+          <p:nvPr/>
+        </p:nvCxnSpPr>
+        <p:spPr>
+          <a:xfrm flipV="1">
+            <a:off x="1709400" y="4021871"/>
+            <a:ext cx="1375055" cy="463350"/>
+          </a:xfrm>
+          <a:prstGeom prst="straightConnector1">
+            <a:avLst/>
+          </a:prstGeom>
+          <a:ln w="25400" cap="flat" cmpd="sng" algn="ctr">
+            <a:solidFill>
+              <a:schemeClr val="accent1"/>
+            </a:solidFill>
+            <a:prstDash val="sysDash"/>
+            <a:round/>
+            <a:headEnd type="none" w="med" len="med"/>
+            <a:tailEnd type="none" w="med" len="med"/>
+          </a:ln>
+          <a:effectLst/>
+        </p:spPr>
+        <p:style>
+          <a:lnRef idx="2">
+            <a:schemeClr val="accent1"/>
+          </a:lnRef>
+          <a:fillRef idx="0">
+            <a:schemeClr val="accent1"/>
+          </a:fillRef>
+          <a:effectRef idx="1">
+            <a:schemeClr val="accent1"/>
+          </a:effectRef>
+          <a:fontRef idx="minor">
+            <a:schemeClr val="tx1"/>
+          </a:fontRef>
+        </p:style>
+      </p:cxnSp>
     </p:spTree>
   </p:cSld>
   <p:clrMapOvr>

</xml_diff>